<commit_message>
Changed video tags to iframe - play with Vimeo
</commit_message>
<xml_diff>
--- a/TeamProject - Katla/Presentation/TeamKatla.pptx
+++ b/TeamProject - Katla/Presentation/TeamKatla.pptx
@@ -4744,8 +4744,11 @@
               <a:rPr lang="en-US" sz="2000" dirty="0" smtClean="0">
                 <a:latin typeface="Georgia" panose="02040502050405020303" pitchFamily="18" charset="0"/>
               </a:rPr>
-              <a:t>JavaScript</a:t>
-            </a:r>
+              <a:t>PHP</a:t>
+            </a:r>
+            <a:endParaRPr lang="en-US" sz="2000" dirty="0" smtClean="0">
+              <a:latin typeface="Georgia" panose="02040502050405020303" pitchFamily="18" charset="0"/>
+            </a:endParaRPr>
           </a:p>
           <a:p>
             <a:r>

</xml_diff>

<commit_message>
New version of TeamKatla.pptx
</commit_message>
<xml_diff>
--- a/TeamProject - Katla/Presentation/TeamKatla.pptx
+++ b/TeamProject - Katla/Presentation/TeamKatla.pptx
@@ -294,7 +294,7 @@
           <a:p>
             <a:fld id="{C55DE790-1C6A-4F67-BD5F-18E95E7DB2B2}" type="datetimeFigureOut">
               <a:rPr lang="bg-BG" smtClean="0"/>
-              <a:t>1.7.2014 г.</a:t>
+              <a:t>3.7.2014 г.</a:t>
             </a:fld>
             <a:endParaRPr lang="bg-BG"/>
           </a:p>
@@ -464,7 +464,7 @@
           <a:p>
             <a:fld id="{C55DE790-1C6A-4F67-BD5F-18E95E7DB2B2}" type="datetimeFigureOut">
               <a:rPr lang="bg-BG" smtClean="0"/>
-              <a:t>1.7.2014 г.</a:t>
+              <a:t>3.7.2014 г.</a:t>
             </a:fld>
             <a:endParaRPr lang="bg-BG"/>
           </a:p>
@@ -644,7 +644,7 @@
           <a:p>
             <a:fld id="{C55DE790-1C6A-4F67-BD5F-18E95E7DB2B2}" type="datetimeFigureOut">
               <a:rPr lang="bg-BG" smtClean="0"/>
-              <a:t>1.7.2014 г.</a:t>
+              <a:t>3.7.2014 г.</a:t>
             </a:fld>
             <a:endParaRPr lang="bg-BG"/>
           </a:p>
@@ -814,7 +814,7 @@
           <a:p>
             <a:fld id="{C55DE790-1C6A-4F67-BD5F-18E95E7DB2B2}" type="datetimeFigureOut">
               <a:rPr lang="bg-BG" smtClean="0"/>
-              <a:t>1.7.2014 г.</a:t>
+              <a:t>3.7.2014 г.</a:t>
             </a:fld>
             <a:endParaRPr lang="bg-BG"/>
           </a:p>
@@ -1060,7 +1060,7 @@
           <a:p>
             <a:fld id="{C55DE790-1C6A-4F67-BD5F-18E95E7DB2B2}" type="datetimeFigureOut">
               <a:rPr lang="bg-BG" smtClean="0"/>
-              <a:t>1.7.2014 г.</a:t>
+              <a:t>3.7.2014 г.</a:t>
             </a:fld>
             <a:endParaRPr lang="bg-BG"/>
           </a:p>
@@ -1348,7 +1348,7 @@
           <a:p>
             <a:fld id="{C55DE790-1C6A-4F67-BD5F-18E95E7DB2B2}" type="datetimeFigureOut">
               <a:rPr lang="bg-BG" smtClean="0"/>
-              <a:t>1.7.2014 г.</a:t>
+              <a:t>3.7.2014 г.</a:t>
             </a:fld>
             <a:endParaRPr lang="bg-BG"/>
           </a:p>
@@ -1770,7 +1770,7 @@
           <a:p>
             <a:fld id="{C55DE790-1C6A-4F67-BD5F-18E95E7DB2B2}" type="datetimeFigureOut">
               <a:rPr lang="bg-BG" smtClean="0"/>
-              <a:t>1.7.2014 г.</a:t>
+              <a:t>3.7.2014 г.</a:t>
             </a:fld>
             <a:endParaRPr lang="bg-BG"/>
           </a:p>
@@ -1888,7 +1888,7 @@
           <a:p>
             <a:fld id="{C55DE790-1C6A-4F67-BD5F-18E95E7DB2B2}" type="datetimeFigureOut">
               <a:rPr lang="bg-BG" smtClean="0"/>
-              <a:t>1.7.2014 г.</a:t>
+              <a:t>3.7.2014 г.</a:t>
             </a:fld>
             <a:endParaRPr lang="bg-BG"/>
           </a:p>
@@ -1983,7 +1983,7 @@
           <a:p>
             <a:fld id="{C55DE790-1C6A-4F67-BD5F-18E95E7DB2B2}" type="datetimeFigureOut">
               <a:rPr lang="bg-BG" smtClean="0"/>
-              <a:t>1.7.2014 г.</a:t>
+              <a:t>3.7.2014 г.</a:t>
             </a:fld>
             <a:endParaRPr lang="bg-BG"/>
           </a:p>
@@ -2260,7 +2260,7 @@
           <a:p>
             <a:fld id="{C55DE790-1C6A-4F67-BD5F-18E95E7DB2B2}" type="datetimeFigureOut">
               <a:rPr lang="bg-BG" smtClean="0"/>
-              <a:t>1.7.2014 г.</a:t>
+              <a:t>3.7.2014 г.</a:t>
             </a:fld>
             <a:endParaRPr lang="bg-BG"/>
           </a:p>
@@ -2513,7 +2513,7 @@
           <a:p>
             <a:fld id="{C55DE790-1C6A-4F67-BD5F-18E95E7DB2B2}" type="datetimeFigureOut">
               <a:rPr lang="bg-BG" smtClean="0"/>
-              <a:t>1.7.2014 г.</a:t>
+              <a:t>3.7.2014 г.</a:t>
             </a:fld>
             <a:endParaRPr lang="bg-BG"/>
           </a:p>
@@ -2735,7 +2735,7 @@
           <a:p>
             <a:fld id="{C55DE790-1C6A-4F67-BD5F-18E95E7DB2B2}" type="datetimeFigureOut">
               <a:rPr lang="bg-BG" smtClean="0"/>
-              <a:t>1.7.2014 г.</a:t>
+              <a:t>3.7.2014 г.</a:t>
             </a:fld>
             <a:endParaRPr lang="bg-BG"/>
           </a:p>
@@ -4378,13 +4378,19 @@
               <a:rPr lang="en-US" sz="2400" dirty="0" smtClean="0">
                 <a:latin typeface="Georgia" panose="02040502050405020303" pitchFamily="18" charset="0"/>
               </a:rPr>
-              <a:t>Java Script </a:t>
+              <a:t>PHP </a:t>
             </a:r>
             <a:r>
               <a:rPr lang="bg-BG" sz="2400" dirty="0" smtClean="0">
                 <a:latin typeface="Georgia" panose="02040502050405020303" pitchFamily="18" charset="0"/>
               </a:rPr>
-              <a:t>за създаване на занимателна игра.</a:t>
+              <a:t>за разработване на калкулатор</a:t>
+            </a:r>
+            <a:r>
+              <a:rPr lang="bg-BG" sz="2400" dirty="0" smtClean="0">
+                <a:latin typeface="Georgia" panose="02040502050405020303" pitchFamily="18" charset="0"/>
+              </a:rPr>
+              <a:t>.</a:t>
             </a:r>
             <a:endParaRPr lang="bg-BG" sz="2400" dirty="0">
               <a:latin typeface="Georgia" panose="02040502050405020303" pitchFamily="18" charset="0"/>
@@ -4746,9 +4752,6 @@
               </a:rPr>
               <a:t>PHP</a:t>
             </a:r>
-            <a:endParaRPr lang="en-US" sz="2000" dirty="0" smtClean="0">
-              <a:latin typeface="Georgia" panose="02040502050405020303" pitchFamily="18" charset="0"/>
-            </a:endParaRPr>
           </a:p>
           <a:p>
             <a:r>

</xml_diff>